<commit_message>
added more info on instructors
</commit_message>
<xml_diff>
--- a/Dia 1/Panorama geral sobre a Linguagem R.pptx
+++ b/Dia 1/Panorama geral sobre a Linguagem R.pptx
@@ -118,7 +118,7 @@
   </p:defaultTextStyle>
   <p:extLst>
     <p:ext uri="{EFAFB233-063F-42B5-8137-9DF3F51BA10A}">
-      <p15:sldGuideLst xmlns:p15="http://schemas.microsoft.com/office/powerpoint/2012/main">
+      <p15:sldGuideLst xmlns:p15="http://schemas.microsoft.com/office/powerpoint/2012/main" xmlns="">
         <p15:guide id="1" orient="horz" pos="2160">
           <p15:clr>
             <a:srgbClr val="A4A3A4"/>
@@ -266,7 +266,7 @@
           <a:p>
             <a:fld id="{291F4518-82E3-4F1C-9E45-93FD173EFC7B}" type="datetimeFigureOut">
               <a:rPr lang="pt-BR" smtClean="0"/>
-              <a:t>20/04/2016</a:t>
+              <a:t>23/04/16</a:t>
             </a:fld>
             <a:endParaRPr lang="pt-BR"/>
           </a:p>
@@ -308,7 +308,7 @@
           <a:p>
             <a:fld id="{525A94AD-C6AA-4886-BDB2-769D8EC548C8}" type="slidenum">
               <a:rPr lang="pt-BR" smtClean="0"/>
-              <a:t>‹nº›</a:t>
+              <a:t>‹#›</a:t>
             </a:fld>
             <a:endParaRPr lang="pt-BR"/>
           </a:p>
@@ -436,7 +436,7 @@
           <a:p>
             <a:fld id="{291F4518-82E3-4F1C-9E45-93FD173EFC7B}" type="datetimeFigureOut">
               <a:rPr lang="pt-BR" smtClean="0"/>
-              <a:t>20/04/2016</a:t>
+              <a:t>23/04/16</a:t>
             </a:fld>
             <a:endParaRPr lang="pt-BR"/>
           </a:p>
@@ -478,7 +478,7 @@
           <a:p>
             <a:fld id="{525A94AD-C6AA-4886-BDB2-769D8EC548C8}" type="slidenum">
               <a:rPr lang="pt-BR" smtClean="0"/>
-              <a:t>‹nº›</a:t>
+              <a:t>‹#›</a:t>
             </a:fld>
             <a:endParaRPr lang="pt-BR"/>
           </a:p>
@@ -616,7 +616,7 @@
           <a:p>
             <a:fld id="{291F4518-82E3-4F1C-9E45-93FD173EFC7B}" type="datetimeFigureOut">
               <a:rPr lang="pt-BR" smtClean="0"/>
-              <a:t>20/04/2016</a:t>
+              <a:t>23/04/16</a:t>
             </a:fld>
             <a:endParaRPr lang="pt-BR"/>
           </a:p>
@@ -658,7 +658,7 @@
           <a:p>
             <a:fld id="{525A94AD-C6AA-4886-BDB2-769D8EC548C8}" type="slidenum">
               <a:rPr lang="pt-BR" smtClean="0"/>
-              <a:t>‹nº›</a:t>
+              <a:t>‹#›</a:t>
             </a:fld>
             <a:endParaRPr lang="pt-BR"/>
           </a:p>
@@ -786,7 +786,7 @@
           <a:p>
             <a:fld id="{291F4518-82E3-4F1C-9E45-93FD173EFC7B}" type="datetimeFigureOut">
               <a:rPr lang="pt-BR" smtClean="0"/>
-              <a:t>20/04/2016</a:t>
+              <a:t>23/04/16</a:t>
             </a:fld>
             <a:endParaRPr lang="pt-BR"/>
           </a:p>
@@ -828,7 +828,7 @@
           <a:p>
             <a:fld id="{525A94AD-C6AA-4886-BDB2-769D8EC548C8}" type="slidenum">
               <a:rPr lang="pt-BR" smtClean="0"/>
-              <a:t>‹nº›</a:t>
+              <a:t>‹#›</a:t>
             </a:fld>
             <a:endParaRPr lang="pt-BR"/>
           </a:p>
@@ -1030,7 +1030,7 @@
           <a:p>
             <a:fld id="{291F4518-82E3-4F1C-9E45-93FD173EFC7B}" type="datetimeFigureOut">
               <a:rPr lang="pt-BR" smtClean="0"/>
-              <a:t>20/04/2016</a:t>
+              <a:t>23/04/16</a:t>
             </a:fld>
             <a:endParaRPr lang="pt-BR"/>
           </a:p>
@@ -1072,7 +1072,7 @@
           <a:p>
             <a:fld id="{525A94AD-C6AA-4886-BDB2-769D8EC548C8}" type="slidenum">
               <a:rPr lang="pt-BR" smtClean="0"/>
-              <a:t>‹nº›</a:t>
+              <a:t>‹#›</a:t>
             </a:fld>
             <a:endParaRPr lang="pt-BR"/>
           </a:p>
@@ -1262,7 +1262,7 @@
           <a:p>
             <a:fld id="{291F4518-82E3-4F1C-9E45-93FD173EFC7B}" type="datetimeFigureOut">
               <a:rPr lang="pt-BR" smtClean="0"/>
-              <a:t>20/04/2016</a:t>
+              <a:t>23/04/16</a:t>
             </a:fld>
             <a:endParaRPr lang="pt-BR"/>
           </a:p>
@@ -1304,7 +1304,7 @@
           <a:p>
             <a:fld id="{525A94AD-C6AA-4886-BDB2-769D8EC548C8}" type="slidenum">
               <a:rPr lang="pt-BR" smtClean="0"/>
-              <a:t>‹nº›</a:t>
+              <a:t>‹#›</a:t>
             </a:fld>
             <a:endParaRPr lang="pt-BR"/>
           </a:p>
@@ -1629,7 +1629,7 @@
           <a:p>
             <a:fld id="{291F4518-82E3-4F1C-9E45-93FD173EFC7B}" type="datetimeFigureOut">
               <a:rPr lang="pt-BR" smtClean="0"/>
-              <a:t>20/04/2016</a:t>
+              <a:t>23/04/16</a:t>
             </a:fld>
             <a:endParaRPr lang="pt-BR"/>
           </a:p>
@@ -1671,7 +1671,7 @@
           <a:p>
             <a:fld id="{525A94AD-C6AA-4886-BDB2-769D8EC548C8}" type="slidenum">
               <a:rPr lang="pt-BR" smtClean="0"/>
-              <a:t>‹nº›</a:t>
+              <a:t>‹#›</a:t>
             </a:fld>
             <a:endParaRPr lang="pt-BR"/>
           </a:p>
@@ -1747,7 +1747,7 @@
           <a:p>
             <a:fld id="{291F4518-82E3-4F1C-9E45-93FD173EFC7B}" type="datetimeFigureOut">
               <a:rPr lang="pt-BR" smtClean="0"/>
-              <a:t>20/04/2016</a:t>
+              <a:t>23/04/16</a:t>
             </a:fld>
             <a:endParaRPr lang="pt-BR"/>
           </a:p>
@@ -1789,7 +1789,7 @@
           <a:p>
             <a:fld id="{525A94AD-C6AA-4886-BDB2-769D8EC548C8}" type="slidenum">
               <a:rPr lang="pt-BR" smtClean="0"/>
-              <a:t>‹nº›</a:t>
+              <a:t>‹#›</a:t>
             </a:fld>
             <a:endParaRPr lang="pt-BR"/>
           </a:p>
@@ -1842,7 +1842,7 @@
           <a:p>
             <a:fld id="{291F4518-82E3-4F1C-9E45-93FD173EFC7B}" type="datetimeFigureOut">
               <a:rPr lang="pt-BR" smtClean="0"/>
-              <a:t>20/04/2016</a:t>
+              <a:t>23/04/16</a:t>
             </a:fld>
             <a:endParaRPr lang="pt-BR"/>
           </a:p>
@@ -1884,7 +1884,7 @@
           <a:p>
             <a:fld id="{525A94AD-C6AA-4886-BDB2-769D8EC548C8}" type="slidenum">
               <a:rPr lang="pt-BR" smtClean="0"/>
-              <a:t>‹nº›</a:t>
+              <a:t>‹#›</a:t>
             </a:fld>
             <a:endParaRPr lang="pt-BR"/>
           </a:p>
@@ -2119,7 +2119,7 @@
           <a:p>
             <a:fld id="{291F4518-82E3-4F1C-9E45-93FD173EFC7B}" type="datetimeFigureOut">
               <a:rPr lang="pt-BR" smtClean="0"/>
-              <a:t>20/04/2016</a:t>
+              <a:t>23/04/16</a:t>
             </a:fld>
             <a:endParaRPr lang="pt-BR"/>
           </a:p>
@@ -2161,7 +2161,7 @@
           <a:p>
             <a:fld id="{525A94AD-C6AA-4886-BDB2-769D8EC548C8}" type="slidenum">
               <a:rPr lang="pt-BR" smtClean="0"/>
-              <a:t>‹nº›</a:t>
+              <a:t>‹#›</a:t>
             </a:fld>
             <a:endParaRPr lang="pt-BR"/>
           </a:p>
@@ -2376,7 +2376,7 @@
           <a:p>
             <a:fld id="{291F4518-82E3-4F1C-9E45-93FD173EFC7B}" type="datetimeFigureOut">
               <a:rPr lang="pt-BR" smtClean="0"/>
-              <a:t>20/04/2016</a:t>
+              <a:t>23/04/16</a:t>
             </a:fld>
             <a:endParaRPr lang="pt-BR"/>
           </a:p>
@@ -2418,7 +2418,7 @@
           <a:p>
             <a:fld id="{525A94AD-C6AA-4886-BDB2-769D8EC548C8}" type="slidenum">
               <a:rPr lang="pt-BR" smtClean="0"/>
-              <a:t>‹nº›</a:t>
+              <a:t>‹#›</a:t>
             </a:fld>
             <a:endParaRPr lang="pt-BR"/>
           </a:p>
@@ -2589,7 +2589,7 @@
           <a:p>
             <a:fld id="{291F4518-82E3-4F1C-9E45-93FD173EFC7B}" type="datetimeFigureOut">
               <a:rPr lang="pt-BR" smtClean="0"/>
-              <a:t>20/04/2016</a:t>
+              <a:t>23/04/16</a:t>
             </a:fld>
             <a:endParaRPr lang="pt-BR"/>
           </a:p>
@@ -2667,7 +2667,7 @@
           <a:p>
             <a:fld id="{525A94AD-C6AA-4886-BDB2-769D8EC548C8}" type="slidenum">
               <a:rPr lang="pt-BR" smtClean="0"/>
-              <a:t>‹nº›</a:t>
+              <a:t>‹#›</a:t>
             </a:fld>
             <a:endParaRPr lang="pt-BR"/>
           </a:p>
@@ -3063,8 +3063,8 @@
         </p:nvSpPr>
         <p:spPr>
           <a:xfrm>
-            <a:off x="570109" y="4939135"/>
-            <a:ext cx="3337260" cy="830997"/>
+            <a:off x="569051" y="4939135"/>
+            <a:ext cx="3339376" cy="1549142"/>
           </a:xfrm>
           <a:prstGeom prst="rect">
             <a:avLst/>
@@ -3093,7 +3093,76 @@
                 <a:latin typeface="Times New Roman"/>
                 <a:cs typeface="Times New Roman"/>
               </a:rPr>
-              <a:t>Nicholas A. C. Marino</a:t>
+              <a:t>Camila dos Santos </a:t>
+            </a:r>
+            <a:r>
+              <a:rPr lang="pt-BR" sz="1600" b="1" smtClean="0">
+                <a:solidFill>
+                  <a:schemeClr val="tx1">
+                    <a:lumMod val="50000"/>
+                    <a:lumOff val="50000"/>
+                  </a:schemeClr>
+                </a:solidFill>
+                <a:latin typeface="Times New Roman"/>
+                <a:cs typeface="Times New Roman"/>
+              </a:rPr>
+              <a:t>de Barros</a:t>
+            </a:r>
+            <a:endParaRPr lang="pt-BR" sz="1600" b="1" dirty="0" smtClean="0">
+              <a:solidFill>
+                <a:schemeClr val="tx1">
+                  <a:lumMod val="50000"/>
+                  <a:lumOff val="50000"/>
+                </a:schemeClr>
+              </a:solidFill>
+              <a:latin typeface="Times New Roman"/>
+              <a:cs typeface="Times New Roman"/>
+            </a:endParaRPr>
+          </a:p>
+          <a:p>
+            <a:pPr algn="just">
+              <a:lnSpc>
+                <a:spcPct val="150000"/>
+              </a:lnSpc>
+            </a:pPr>
+            <a:r>
+              <a:rPr lang="pt-BR" sz="1600" b="1" dirty="0" smtClean="0">
+                <a:solidFill>
+                  <a:schemeClr val="tx1">
+                    <a:lumMod val="50000"/>
+                    <a:lumOff val="50000"/>
+                  </a:schemeClr>
+                </a:solidFill>
+                <a:latin typeface="Times New Roman"/>
+                <a:cs typeface="Times New Roman"/>
+              </a:rPr>
+              <a:t>Nicholas </a:t>
+            </a:r>
+            <a:r>
+              <a:rPr lang="pt-BR" sz="1600" b="1" dirty="0" smtClean="0">
+                <a:solidFill>
+                  <a:schemeClr val="tx1">
+                    <a:lumMod val="50000"/>
+                    <a:lumOff val="50000"/>
+                  </a:schemeClr>
+                </a:solidFill>
+                <a:latin typeface="Times New Roman"/>
+                <a:cs typeface="Times New Roman"/>
+              </a:rPr>
+              <a:t>A. C. </a:t>
+            </a:r>
+            <a:r>
+              <a:rPr lang="pt-BR" sz="1600" b="1" dirty="0" smtClean="0">
+                <a:solidFill>
+                  <a:schemeClr val="tx1">
+                    <a:lumMod val="50000"/>
+                    <a:lumOff val="50000"/>
+                  </a:schemeClr>
+                </a:solidFill>
+                <a:latin typeface="Times New Roman"/>
+                <a:cs typeface="Times New Roman"/>
+              </a:rPr>
+              <a:t>Marino</a:t>
             </a:r>
             <a:endParaRPr lang="pt-BR" sz="1600" b="1" dirty="0">
               <a:solidFill>
@@ -3123,7 +3192,7 @@
                 <a:latin typeface="Times New Roman"/>
                 <a:cs typeface="Times New Roman"/>
               </a:rPr>
-              <a:t>github</a:t>
+              <a:t>Vitor Borges J</a:t>
             </a:r>
             <a:r>
               <a:rPr lang="pt-BR" sz="1600" b="1" dirty="0" smtClean="0">
@@ -3136,7 +3205,50 @@
                 <a:latin typeface="Times New Roman"/>
                 <a:cs typeface="Times New Roman"/>
               </a:rPr>
-              <a:t>.com/</a:t>
+              <a:t>r.</a:t>
+            </a:r>
+            <a:endParaRPr lang="pt-BR" sz="1600" b="1" dirty="0" smtClean="0">
+              <a:solidFill>
+                <a:schemeClr val="tx1">
+                  <a:lumMod val="50000"/>
+                  <a:lumOff val="50000"/>
+                </a:schemeClr>
+              </a:solidFill>
+              <a:latin typeface="Times New Roman"/>
+              <a:cs typeface="Times New Roman"/>
+            </a:endParaRPr>
+          </a:p>
+          <a:p>
+            <a:pPr algn="just">
+              <a:lnSpc>
+                <a:spcPct val="150000"/>
+              </a:lnSpc>
+            </a:pPr>
+            <a:r>
+              <a:rPr lang="pt-BR" sz="1600" b="1" dirty="0" err="1" smtClean="0">
+                <a:solidFill>
+                  <a:schemeClr val="tx1">
+                    <a:lumMod val="50000"/>
+                    <a:lumOff val="50000"/>
+                  </a:schemeClr>
+                </a:solidFill>
+                <a:latin typeface="Times New Roman"/>
+                <a:cs typeface="Times New Roman"/>
+              </a:rPr>
+              <a:t>github.com</a:t>
+            </a:r>
+            <a:r>
+              <a:rPr lang="pt-BR" sz="1600" b="1" dirty="0" smtClean="0">
+                <a:solidFill>
+                  <a:schemeClr val="tx1">
+                    <a:lumMod val="50000"/>
+                    <a:lumOff val="50000"/>
+                  </a:schemeClr>
+                </a:solidFill>
+                <a:latin typeface="Times New Roman"/>
+                <a:cs typeface="Times New Roman"/>
+              </a:rPr>
+              <a:t>/</a:t>
             </a:r>
             <a:r>
               <a:rPr lang="pt-BR" sz="1600" b="1" dirty="0" err="1" smtClean="0">
@@ -3227,7 +3339,7 @@
   <p:timing>
     <p:tnLst>
       <p:par>
-        <p:cTn id="1" dur="indefinite" restart="never" nodeType="tmRoot"/>
+        <p:cTn xmlns:p14="http://schemas.microsoft.com/office/powerpoint/2010/main" id="1" dur="indefinite" restart="never" nodeType="tmRoot"/>
       </p:par>
     </p:tnLst>
   </p:timing>
@@ -5608,7 +5720,7 @@
   <p:timing>
     <p:tnLst>
       <p:par>
-        <p:cTn id="1" dur="indefinite" restart="never" nodeType="tmRoot"/>
+        <p:cTn xmlns:p14="http://schemas.microsoft.com/office/powerpoint/2010/main" id="1" dur="indefinite" restart="never" nodeType="tmRoot"/>
       </p:par>
     </p:tnLst>
   </p:timing>
@@ -6935,7 +7047,7 @@
   <p:timing>
     <p:tnLst>
       <p:par>
-        <p:cTn id="1" dur="indefinite" restart="never" nodeType="tmRoot"/>
+        <p:cTn xmlns:p14="http://schemas.microsoft.com/office/powerpoint/2010/main" id="1" dur="indefinite" restart="never" nodeType="tmRoot"/>
       </p:par>
     </p:tnLst>
   </p:timing>
@@ -7456,7 +7568,7 @@
   <p:timing>
     <p:tnLst>
       <p:par>
-        <p:cTn id="1" dur="indefinite" restart="never" nodeType="tmRoot"/>
+        <p:cTn xmlns:p14="http://schemas.microsoft.com/office/powerpoint/2010/main" id="1" dur="indefinite" restart="never" nodeType="tmRoot"/>
       </p:par>
     </p:tnLst>
   </p:timing>
@@ -8533,7 +8645,7 @@
   <p:timing>
     <p:tnLst>
       <p:par>
-        <p:cTn id="1" dur="indefinite" restart="never" nodeType="tmRoot"/>
+        <p:cTn xmlns:p14="http://schemas.microsoft.com/office/powerpoint/2010/main" id="1" dur="indefinite" restart="never" nodeType="tmRoot"/>
       </p:par>
     </p:tnLst>
   </p:timing>
@@ -11989,7 +12101,7 @@
   <a:extraClrSchemeLst/>
   <a:extLst>
     <a:ext uri="{05A4C25C-085E-4340-85A3-A5531E510DB2}">
-      <thm15:themeFamily xmlns:thm15="http://schemas.microsoft.com/office/thememl/2012/main" name="Office Theme" id="{62F939B6-93AF-4DB8-9C6B-D6C7DFDC589F}" vid="{4A3C46E8-61CC-4603-A589-7422A47A8E4A}"/>
+      <thm15:themeFamily xmlns:thm15="http://schemas.microsoft.com/office/thememl/2012/main" xmlns="" name="Office Theme" id="{62F939B6-93AF-4DB8-9C6B-D6C7DFDC589F}" vid="{4A3C46E8-61CC-4603-A589-7422A47A8E4A}"/>
     </a:ext>
   </a:extLst>
 </a:theme>

</xml_diff>